<commit_message>
added presentation and modified network and values
</commit_message>
<xml_diff>
--- a/Licenta2018DorneanuCristian/AGEN.pptx
+++ b/Licenta2018DorneanuCristian/AGEN.pptx
@@ -725,7 +725,7 @@
           <a:noFill/>
           <a:extLst>
             <a:ext uri="{909E8E84-426E-40dd-AFC4-6F175D3DCCD1}">
-              <a14:hiddenFill xmlns="" xmlns:a14="http://schemas.microsoft.com/office/drawing/2010/main">
+              <a14:hiddenFill xmlns:a14="http://schemas.microsoft.com/office/drawing/2010/main" xmlns="">
                 <a:solidFill>
                   <a:srgbClr val="FFFFFF"/>
                 </a:solidFill>
@@ -785,7 +785,7 @@
             </a:ln>
             <a:extLst>
               <a:ext uri="{91240B29-F687-4f45-9708-019B960494DF}">
-                <a14:hiddenLine xmlns="" xmlns:a14="http://schemas.microsoft.com/office/drawing/2010/main" w="9525">
+                <a14:hiddenLine xmlns:a14="http://schemas.microsoft.com/office/drawing/2010/main" xmlns="" w="9525">
                   <a:solidFill>
                     <a:srgbClr val="000000"/>
                   </a:solidFill>
@@ -875,7 +875,7 @@
             </a:ln>
             <a:extLst>
               <a:ext uri="{91240B29-F687-4f45-9708-019B960494DF}">
-                <a14:hiddenLine xmlns="" xmlns:a14="http://schemas.microsoft.com/office/drawing/2010/main" w="9525">
+                <a14:hiddenLine xmlns:a14="http://schemas.microsoft.com/office/drawing/2010/main" xmlns="" w="9525">
                   <a:solidFill>
                     <a:srgbClr val="000000"/>
                   </a:solidFill>
@@ -965,7 +965,7 @@
             </a:ln>
             <a:extLst>
               <a:ext uri="{91240B29-F687-4f45-9708-019B960494DF}">
-                <a14:hiddenLine xmlns="" xmlns:a14="http://schemas.microsoft.com/office/drawing/2010/main" w="9525">
+                <a14:hiddenLine xmlns:a14="http://schemas.microsoft.com/office/drawing/2010/main" xmlns="" w="9525">
                   <a:solidFill>
                     <a:srgbClr val="000000"/>
                   </a:solidFill>
@@ -999,7 +999,7 @@
             </a:ln>
             <a:extLst>
               <a:ext uri="{91240B29-F687-4f45-9708-019B960494DF}">
-                <a14:hiddenLine xmlns="" xmlns:a14="http://schemas.microsoft.com/office/drawing/2010/main" w="9525">
+                <a14:hiddenLine xmlns:a14="http://schemas.microsoft.com/office/drawing/2010/main" xmlns="" w="9525">
                   <a:solidFill>
                     <a:srgbClr val="000000"/>
                   </a:solidFill>
@@ -1089,7 +1089,7 @@
             </a:ln>
             <a:extLst>
               <a:ext uri="{91240B29-F687-4f45-9708-019B960494DF}">
-                <a14:hiddenLine xmlns="" xmlns:a14="http://schemas.microsoft.com/office/drawing/2010/main" w="9525">
+                <a14:hiddenLine xmlns:a14="http://schemas.microsoft.com/office/drawing/2010/main" xmlns="" w="9525">
                   <a:solidFill>
                     <a:srgbClr val="000000"/>
                   </a:solidFill>
@@ -1151,7 +1151,7 @@
             </a:ln>
             <a:extLst>
               <a:ext uri="{91240B29-F687-4f45-9708-019B960494DF}">
-                <a14:hiddenLine xmlns="" xmlns:a14="http://schemas.microsoft.com/office/drawing/2010/main" w="9525">
+                <a14:hiddenLine xmlns:a14="http://schemas.microsoft.com/office/drawing/2010/main" xmlns="" w="9525">
                   <a:solidFill>
                     <a:srgbClr val="000000"/>
                   </a:solidFill>
@@ -1213,7 +1213,7 @@
             </a:ln>
             <a:extLst>
               <a:ext uri="{91240B29-F687-4f45-9708-019B960494DF}">
-                <a14:hiddenLine xmlns="" xmlns:a14="http://schemas.microsoft.com/office/drawing/2010/main" w="9525">
+                <a14:hiddenLine xmlns:a14="http://schemas.microsoft.com/office/drawing/2010/main" xmlns="" w="9525">
                   <a:solidFill>
                     <a:srgbClr val="000000"/>
                   </a:solidFill>
@@ -1303,7 +1303,7 @@
             </a:ln>
             <a:extLst>
               <a:ext uri="{91240B29-F687-4f45-9708-019B960494DF}">
-                <a14:hiddenLine xmlns="" xmlns:a14="http://schemas.microsoft.com/office/drawing/2010/main" w="9525">
+                <a14:hiddenLine xmlns:a14="http://schemas.microsoft.com/office/drawing/2010/main" xmlns="" w="9525">
                   <a:solidFill>
                     <a:srgbClr val="000000"/>
                   </a:solidFill>
@@ -1365,7 +1365,7 @@
             </a:ln>
             <a:extLst>
               <a:ext uri="{91240B29-F687-4f45-9708-019B960494DF}">
-                <a14:hiddenLine xmlns="" xmlns:a14="http://schemas.microsoft.com/office/drawing/2010/main" w="9525">
+                <a14:hiddenLine xmlns:a14="http://schemas.microsoft.com/office/drawing/2010/main" xmlns="" w="9525">
                   <a:solidFill>
                     <a:srgbClr val="000000"/>
                   </a:solidFill>
@@ -1427,7 +1427,7 @@
             </a:ln>
             <a:extLst>
               <a:ext uri="{91240B29-F687-4f45-9708-019B960494DF}">
-                <a14:hiddenLine xmlns="" xmlns:a14="http://schemas.microsoft.com/office/drawing/2010/main" w="9525">
+                <a14:hiddenLine xmlns:a14="http://schemas.microsoft.com/office/drawing/2010/main" xmlns="" w="9525">
                   <a:solidFill>
                     <a:srgbClr val="000000"/>
                   </a:solidFill>
@@ -1517,7 +1517,7 @@
             </a:ln>
             <a:extLst>
               <a:ext uri="{91240B29-F687-4f45-9708-019B960494DF}">
-                <a14:hiddenLine xmlns="" xmlns:a14="http://schemas.microsoft.com/office/drawing/2010/main" w="9525">
+                <a14:hiddenLine xmlns:a14="http://schemas.microsoft.com/office/drawing/2010/main" xmlns="" w="9525">
                   <a:solidFill>
                     <a:srgbClr val="000000"/>
                   </a:solidFill>
@@ -1607,7 +1607,7 @@
             </a:ln>
             <a:extLst>
               <a:ext uri="{91240B29-F687-4f45-9708-019B960494DF}">
-                <a14:hiddenLine xmlns="" xmlns:a14="http://schemas.microsoft.com/office/drawing/2010/main" w="9525">
+                <a14:hiddenLine xmlns:a14="http://schemas.microsoft.com/office/drawing/2010/main" xmlns="" w="9525">
                   <a:solidFill>
                     <a:srgbClr val="000000"/>
                   </a:solidFill>
@@ -1669,7 +1669,7 @@
             </a:ln>
             <a:extLst>
               <a:ext uri="{91240B29-F687-4f45-9708-019B960494DF}">
-                <a14:hiddenLine xmlns="" xmlns:a14="http://schemas.microsoft.com/office/drawing/2010/main" w="9525">
+                <a14:hiddenLine xmlns:a14="http://schemas.microsoft.com/office/drawing/2010/main" xmlns="" w="9525">
                   <a:solidFill>
                     <a:srgbClr val="000000"/>
                   </a:solidFill>
@@ -1779,7 +1779,7 @@
             </a:ln>
             <a:extLst>
               <a:ext uri="{91240B29-F687-4f45-9708-019B960494DF}">
-                <a14:hiddenLine xmlns="" xmlns:a14="http://schemas.microsoft.com/office/drawing/2010/main" w="9525">
+                <a14:hiddenLine xmlns:a14="http://schemas.microsoft.com/office/drawing/2010/main" xmlns="" w="9525">
                   <a:solidFill>
                     <a:srgbClr val="000000"/>
                   </a:solidFill>
@@ -1841,7 +1841,7 @@
             </a:ln>
             <a:extLst>
               <a:ext uri="{91240B29-F687-4f45-9708-019B960494DF}">
-                <a14:hiddenLine xmlns="" xmlns:a14="http://schemas.microsoft.com/office/drawing/2010/main" w="9525">
+                <a14:hiddenLine xmlns:a14="http://schemas.microsoft.com/office/drawing/2010/main" xmlns="" w="9525">
                   <a:solidFill>
                     <a:srgbClr val="000000"/>
                   </a:solidFill>
@@ -1931,7 +1931,7 @@
             </a:ln>
             <a:extLst>
               <a:ext uri="{91240B29-F687-4f45-9708-019B960494DF}">
-                <a14:hiddenLine xmlns="" xmlns:a14="http://schemas.microsoft.com/office/drawing/2010/main" w="9525">
+                <a14:hiddenLine xmlns:a14="http://schemas.microsoft.com/office/drawing/2010/main" xmlns="" w="9525">
                   <a:solidFill>
                     <a:srgbClr val="000000"/>
                   </a:solidFill>
@@ -2021,7 +2021,7 @@
             </a:ln>
             <a:extLst>
               <a:ext uri="{91240B29-F687-4f45-9708-019B960494DF}">
-                <a14:hiddenLine xmlns="" xmlns:a14="http://schemas.microsoft.com/office/drawing/2010/main" w="9525">
+                <a14:hiddenLine xmlns:a14="http://schemas.microsoft.com/office/drawing/2010/main" xmlns="" w="9525">
                   <a:solidFill>
                     <a:srgbClr val="000000"/>
                   </a:solidFill>
@@ -2083,7 +2083,7 @@
             </a:ln>
             <a:extLst>
               <a:ext uri="{91240B29-F687-4f45-9708-019B960494DF}">
-                <a14:hiddenLine xmlns="" xmlns:a14="http://schemas.microsoft.com/office/drawing/2010/main" w="9525">
+                <a14:hiddenLine xmlns:a14="http://schemas.microsoft.com/office/drawing/2010/main" xmlns="" w="9525">
                   <a:solidFill>
                     <a:srgbClr val="000000"/>
                   </a:solidFill>
@@ -2173,7 +2173,7 @@
             </a:ln>
             <a:extLst>
               <a:ext uri="{91240B29-F687-4f45-9708-019B960494DF}">
-                <a14:hiddenLine xmlns="" xmlns:a14="http://schemas.microsoft.com/office/drawing/2010/main" w="9525">
+                <a14:hiddenLine xmlns:a14="http://schemas.microsoft.com/office/drawing/2010/main" xmlns="" w="9525">
                   <a:solidFill>
                     <a:srgbClr val="000000"/>
                   </a:solidFill>
@@ -2263,7 +2263,7 @@
             </a:ln>
             <a:extLst>
               <a:ext uri="{91240B29-F687-4f45-9708-019B960494DF}">
-                <a14:hiddenLine xmlns="" xmlns:a14="http://schemas.microsoft.com/office/drawing/2010/main" w="9525">
+                <a14:hiddenLine xmlns:a14="http://schemas.microsoft.com/office/drawing/2010/main" xmlns="" w="9525">
                   <a:solidFill>
                     <a:srgbClr val="000000"/>
                   </a:solidFill>
@@ -2319,7 +2319,7 @@
             </a:ln>
             <a:extLst>
               <a:ext uri="{91240B29-F687-4f45-9708-019B960494DF}">
-                <a14:hiddenLine xmlns="" xmlns:a14="http://schemas.microsoft.com/office/drawing/2010/main" w="9525">
+                <a14:hiddenLine xmlns:a14="http://schemas.microsoft.com/office/drawing/2010/main" xmlns="" w="9525">
                   <a:solidFill>
                     <a:srgbClr val="000000"/>
                   </a:solidFill>
@@ -2409,7 +2409,7 @@
             </a:ln>
             <a:extLst>
               <a:ext uri="{91240B29-F687-4f45-9708-019B960494DF}">
-                <a14:hiddenLine xmlns="" xmlns:a14="http://schemas.microsoft.com/office/drawing/2010/main" w="9525">
+                <a14:hiddenLine xmlns:a14="http://schemas.microsoft.com/office/drawing/2010/main" xmlns="" w="9525">
                   <a:solidFill>
                     <a:srgbClr val="000000"/>
                   </a:solidFill>
@@ -2465,7 +2465,7 @@
             </a:ln>
             <a:extLst>
               <a:ext uri="{91240B29-F687-4f45-9708-019B960494DF}">
-                <a14:hiddenLine xmlns="" xmlns:a14="http://schemas.microsoft.com/office/drawing/2010/main" w="9525">
+                <a14:hiddenLine xmlns:a14="http://schemas.microsoft.com/office/drawing/2010/main" xmlns="" w="9525">
                   <a:solidFill>
                     <a:srgbClr val="000000"/>
                   </a:solidFill>
@@ -2555,7 +2555,7 @@
             </a:ln>
             <a:extLst>
               <a:ext uri="{91240B29-F687-4f45-9708-019B960494DF}">
-                <a14:hiddenLine xmlns="" xmlns:a14="http://schemas.microsoft.com/office/drawing/2010/main" w="9525">
+                <a14:hiddenLine xmlns:a14="http://schemas.microsoft.com/office/drawing/2010/main" xmlns="" w="9525">
                   <a:solidFill>
                     <a:srgbClr val="000000"/>
                   </a:solidFill>
@@ -2623,7 +2623,7 @@
             </a:ln>
             <a:extLst>
               <a:ext uri="{91240B29-F687-4f45-9708-019B960494DF}">
-                <a14:hiddenLine xmlns="" xmlns:a14="http://schemas.microsoft.com/office/drawing/2010/main" w="9525">
+                <a14:hiddenLine xmlns:a14="http://schemas.microsoft.com/office/drawing/2010/main" xmlns="" w="9525">
                   <a:solidFill>
                     <a:srgbClr val="000000"/>
                   </a:solidFill>
@@ -2713,7 +2713,7 @@
             </a:ln>
             <a:extLst>
               <a:ext uri="{91240B29-F687-4f45-9708-019B960494DF}">
-                <a14:hiddenLine xmlns="" xmlns:a14="http://schemas.microsoft.com/office/drawing/2010/main" w="9525">
+                <a14:hiddenLine xmlns:a14="http://schemas.microsoft.com/office/drawing/2010/main" xmlns="" w="9525">
                   <a:solidFill>
                     <a:srgbClr val="000000"/>
                   </a:solidFill>
@@ -2781,7 +2781,7 @@
             </a:ln>
             <a:extLst>
               <a:ext uri="{91240B29-F687-4f45-9708-019B960494DF}">
-                <a14:hiddenLine xmlns="" xmlns:a14="http://schemas.microsoft.com/office/drawing/2010/main" w="9525">
+                <a14:hiddenLine xmlns:a14="http://schemas.microsoft.com/office/drawing/2010/main" xmlns="" w="9525">
                   <a:solidFill>
                     <a:srgbClr val="000000"/>
                   </a:solidFill>
@@ -2871,7 +2871,7 @@
             </a:ln>
             <a:extLst>
               <a:ext uri="{91240B29-F687-4f45-9708-019B960494DF}">
-                <a14:hiddenLine xmlns="" xmlns:a14="http://schemas.microsoft.com/office/drawing/2010/main" w="9525">
+                <a14:hiddenLine xmlns:a14="http://schemas.microsoft.com/office/drawing/2010/main" xmlns="" w="9525">
                   <a:solidFill>
                     <a:srgbClr val="000000"/>
                   </a:solidFill>
@@ -2905,7 +2905,7 @@
             </a:ln>
             <a:extLst>
               <a:ext uri="{91240B29-F687-4f45-9708-019B960494DF}">
-                <a14:hiddenLine xmlns="" xmlns:a14="http://schemas.microsoft.com/office/drawing/2010/main" w="9525">
+                <a14:hiddenLine xmlns:a14="http://schemas.microsoft.com/office/drawing/2010/main" xmlns="" w="9525">
                   <a:solidFill>
                     <a:srgbClr val="000000"/>
                   </a:solidFill>
@@ -2995,7 +2995,7 @@
             </a:ln>
             <a:extLst>
               <a:ext uri="{91240B29-F687-4f45-9708-019B960494DF}">
-                <a14:hiddenLine xmlns="" xmlns:a14="http://schemas.microsoft.com/office/drawing/2010/main" w="9525">
+                <a14:hiddenLine xmlns:a14="http://schemas.microsoft.com/office/drawing/2010/main" xmlns="" w="9525">
                   <a:solidFill>
                     <a:srgbClr val="000000"/>
                   </a:solidFill>
@@ -3057,7 +3057,7 @@
             </a:ln>
             <a:extLst>
               <a:ext uri="{91240B29-F687-4f45-9708-019B960494DF}">
-                <a14:hiddenLine xmlns="" xmlns:a14="http://schemas.microsoft.com/office/drawing/2010/main" w="9525">
+                <a14:hiddenLine xmlns:a14="http://schemas.microsoft.com/office/drawing/2010/main" xmlns="" w="9525">
                   <a:solidFill>
                     <a:srgbClr val="000000"/>
                   </a:solidFill>
@@ -3119,7 +3119,7 @@
             </a:ln>
             <a:extLst>
               <a:ext uri="{91240B29-F687-4f45-9708-019B960494DF}">
-                <a14:hiddenLine xmlns="" xmlns:a14="http://schemas.microsoft.com/office/drawing/2010/main" w="9525">
+                <a14:hiddenLine xmlns:a14="http://schemas.microsoft.com/office/drawing/2010/main" xmlns="" w="9525">
                   <a:solidFill>
                     <a:srgbClr val="000000"/>
                   </a:solidFill>
@@ -3209,7 +3209,7 @@
             </a:ln>
             <a:extLst>
               <a:ext uri="{91240B29-F687-4f45-9708-019B960494DF}">
-                <a14:hiddenLine xmlns="" xmlns:a14="http://schemas.microsoft.com/office/drawing/2010/main" w="9525">
+                <a14:hiddenLine xmlns:a14="http://schemas.microsoft.com/office/drawing/2010/main" xmlns="" w="9525">
                   <a:solidFill>
                     <a:srgbClr val="000000"/>
                   </a:solidFill>
@@ -3277,7 +3277,7 @@
             </a:ln>
             <a:extLst>
               <a:ext uri="{91240B29-F687-4f45-9708-019B960494DF}">
-                <a14:hiddenLine xmlns="" xmlns:a14="http://schemas.microsoft.com/office/drawing/2010/main" w="9525">
+                <a14:hiddenLine xmlns:a14="http://schemas.microsoft.com/office/drawing/2010/main" xmlns="" w="9525">
                   <a:solidFill>
                     <a:srgbClr val="000000"/>
                   </a:solidFill>
@@ -3339,7 +3339,7 @@
             </a:ln>
             <a:extLst>
               <a:ext uri="{91240B29-F687-4f45-9708-019B960494DF}">
-                <a14:hiddenLine xmlns="" xmlns:a14="http://schemas.microsoft.com/office/drawing/2010/main" w="9525">
+                <a14:hiddenLine xmlns:a14="http://schemas.microsoft.com/office/drawing/2010/main" xmlns="" w="9525">
                   <a:solidFill>
                     <a:srgbClr val="000000"/>
                   </a:solidFill>
@@ -3429,7 +3429,7 @@
             </a:ln>
             <a:extLst>
               <a:ext uri="{91240B29-F687-4f45-9708-019B960494DF}">
-                <a14:hiddenLine xmlns="" xmlns:a14="http://schemas.microsoft.com/office/drawing/2010/main" w="9525">
+                <a14:hiddenLine xmlns:a14="http://schemas.microsoft.com/office/drawing/2010/main" xmlns="" w="9525">
                   <a:solidFill>
                     <a:srgbClr val="000000"/>
                   </a:solidFill>
@@ -3491,7 +3491,7 @@
             </a:ln>
             <a:extLst>
               <a:ext uri="{91240B29-F687-4f45-9708-019B960494DF}">
-                <a14:hiddenLine xmlns="" xmlns:a14="http://schemas.microsoft.com/office/drawing/2010/main" w="9525">
+                <a14:hiddenLine xmlns:a14="http://schemas.microsoft.com/office/drawing/2010/main" xmlns="" w="9525">
                   <a:solidFill>
                     <a:srgbClr val="000000"/>
                   </a:solidFill>
@@ -3581,7 +3581,7 @@
             </a:ln>
             <a:extLst>
               <a:ext uri="{91240B29-F687-4f45-9708-019B960494DF}">
-                <a14:hiddenLine xmlns="" xmlns:a14="http://schemas.microsoft.com/office/drawing/2010/main" w="9525">
+                <a14:hiddenLine xmlns:a14="http://schemas.microsoft.com/office/drawing/2010/main" xmlns="" w="9525">
                   <a:solidFill>
                     <a:srgbClr val="000000"/>
                   </a:solidFill>
@@ -3643,7 +3643,7 @@
             </a:ln>
             <a:extLst>
               <a:ext uri="{91240B29-F687-4f45-9708-019B960494DF}">
-                <a14:hiddenLine xmlns="" xmlns:a14="http://schemas.microsoft.com/office/drawing/2010/main" w="9525">
+                <a14:hiddenLine xmlns:a14="http://schemas.microsoft.com/office/drawing/2010/main" xmlns="" w="9525">
                   <a:solidFill>
                     <a:srgbClr val="000000"/>
                   </a:solidFill>
@@ -3733,7 +3733,7 @@
             </a:ln>
             <a:extLst>
               <a:ext uri="{91240B29-F687-4f45-9708-019B960494DF}">
-                <a14:hiddenLine xmlns="" xmlns:a14="http://schemas.microsoft.com/office/drawing/2010/main" w="9525">
+                <a14:hiddenLine xmlns:a14="http://schemas.microsoft.com/office/drawing/2010/main" xmlns="" w="9525">
                   <a:solidFill>
                     <a:srgbClr val="000000"/>
                   </a:solidFill>
@@ -3767,7 +3767,7 @@
             </a:ln>
             <a:extLst>
               <a:ext uri="{91240B29-F687-4f45-9708-019B960494DF}">
-                <a14:hiddenLine xmlns="" xmlns:a14="http://schemas.microsoft.com/office/drawing/2010/main" w="9525">
+                <a14:hiddenLine xmlns:a14="http://schemas.microsoft.com/office/drawing/2010/main" xmlns="" w="9525">
                   <a:solidFill>
                     <a:srgbClr val="000000"/>
                   </a:solidFill>
@@ -3832,7 +3832,7 @@
             </a:ln>
             <a:extLst>
               <a:ext uri="{91240B29-F687-4f45-9708-019B960494DF}">
-                <a14:hiddenLine xmlns="" xmlns:a14="http://schemas.microsoft.com/office/drawing/2010/main" w="9525">
+                <a14:hiddenLine xmlns:a14="http://schemas.microsoft.com/office/drawing/2010/main" xmlns="" w="9525">
                   <a:solidFill>
                     <a:srgbClr val="000000"/>
                   </a:solidFill>
@@ -3922,7 +3922,7 @@
             </a:ln>
             <a:extLst>
               <a:ext uri="{91240B29-F687-4f45-9708-019B960494DF}">
-                <a14:hiddenLine xmlns="" xmlns:a14="http://schemas.microsoft.com/office/drawing/2010/main" w="9525">
+                <a14:hiddenLine xmlns:a14="http://schemas.microsoft.com/office/drawing/2010/main" xmlns="" w="9525">
                   <a:solidFill>
                     <a:srgbClr val="000000"/>
                   </a:solidFill>
@@ -3984,7 +3984,7 @@
             </a:ln>
             <a:extLst>
               <a:ext uri="{91240B29-F687-4f45-9708-019B960494DF}">
-                <a14:hiddenLine xmlns="" xmlns:a14="http://schemas.microsoft.com/office/drawing/2010/main" w="9525">
+                <a14:hiddenLine xmlns:a14="http://schemas.microsoft.com/office/drawing/2010/main" xmlns="" w="9525">
                   <a:solidFill>
                     <a:srgbClr val="000000"/>
                   </a:solidFill>
@@ -4074,7 +4074,7 @@
             </a:ln>
             <a:extLst>
               <a:ext uri="{91240B29-F687-4f45-9708-019B960494DF}">
-                <a14:hiddenLine xmlns="" xmlns:a14="http://schemas.microsoft.com/office/drawing/2010/main" w="9525">
+                <a14:hiddenLine xmlns:a14="http://schemas.microsoft.com/office/drawing/2010/main" xmlns="" w="9525">
                   <a:solidFill>
                     <a:srgbClr val="000000"/>
                   </a:solidFill>
@@ -4164,7 +4164,7 @@
             </a:ln>
             <a:extLst>
               <a:ext uri="{91240B29-F687-4f45-9708-019B960494DF}">
-                <a14:hiddenLine xmlns="" xmlns:a14="http://schemas.microsoft.com/office/drawing/2010/main" w="9525">
+                <a14:hiddenLine xmlns:a14="http://schemas.microsoft.com/office/drawing/2010/main" xmlns="" w="9525">
                   <a:solidFill>
                     <a:srgbClr val="000000"/>
                   </a:solidFill>
@@ -4229,7 +4229,7 @@
             </a:ln>
             <a:extLst>
               <a:ext uri="{91240B29-F687-4f45-9708-019B960494DF}">
-                <a14:hiddenLine xmlns="" xmlns:a14="http://schemas.microsoft.com/office/drawing/2010/main" w="9525">
+                <a14:hiddenLine xmlns:a14="http://schemas.microsoft.com/office/drawing/2010/main" xmlns="" w="9525">
                   <a:solidFill>
                     <a:srgbClr val="000000"/>
                   </a:solidFill>
@@ -4291,7 +4291,7 @@
             </a:ln>
             <a:extLst>
               <a:ext uri="{91240B29-F687-4f45-9708-019B960494DF}">
-                <a14:hiddenLine xmlns="" xmlns:a14="http://schemas.microsoft.com/office/drawing/2010/main" w="9525">
+                <a14:hiddenLine xmlns:a14="http://schemas.microsoft.com/office/drawing/2010/main" xmlns="" w="9525">
                   <a:solidFill>
                     <a:srgbClr val="000000"/>
                   </a:solidFill>
@@ -4381,7 +4381,7 @@
             </a:ln>
             <a:extLst>
               <a:ext uri="{91240B29-F687-4f45-9708-019B960494DF}">
-                <a14:hiddenLine xmlns="" xmlns:a14="http://schemas.microsoft.com/office/drawing/2010/main" w="9525">
+                <a14:hiddenLine xmlns:a14="http://schemas.microsoft.com/office/drawing/2010/main" xmlns="" w="9525">
                   <a:solidFill>
                     <a:srgbClr val="000000"/>
                   </a:solidFill>
@@ -4471,7 +4471,7 @@
             </a:ln>
             <a:extLst>
               <a:ext uri="{91240B29-F687-4f45-9708-019B960494DF}">
-                <a14:hiddenLine xmlns="" xmlns:a14="http://schemas.microsoft.com/office/drawing/2010/main" w="9525">
+                <a14:hiddenLine xmlns:a14="http://schemas.microsoft.com/office/drawing/2010/main" xmlns="" w="9525">
                   <a:solidFill>
                     <a:srgbClr val="000000"/>
                   </a:solidFill>
@@ -4533,7 +4533,7 @@
             </a:ln>
             <a:extLst>
               <a:ext uri="{91240B29-F687-4f45-9708-019B960494DF}">
-                <a14:hiddenLine xmlns="" xmlns:a14="http://schemas.microsoft.com/office/drawing/2010/main" w="9525">
+                <a14:hiddenLine xmlns:a14="http://schemas.microsoft.com/office/drawing/2010/main" xmlns="" w="9525">
                   <a:solidFill>
                     <a:srgbClr val="000000"/>
                   </a:solidFill>
@@ -4653,7 +4653,7 @@
             </a:ln>
             <a:extLst>
               <a:ext uri="{91240B29-F687-4f45-9708-019B960494DF}">
-                <a14:hiddenLine xmlns="" xmlns:a14="http://schemas.microsoft.com/office/drawing/2010/main" w="9525">
+                <a14:hiddenLine xmlns:a14="http://schemas.microsoft.com/office/drawing/2010/main" xmlns="" w="9525">
                   <a:solidFill>
                     <a:srgbClr val="000000"/>
                   </a:solidFill>
@@ -4721,7 +4721,7 @@
             </a:ln>
             <a:extLst>
               <a:ext uri="{91240B29-F687-4f45-9708-019B960494DF}">
-                <a14:hiddenLine xmlns="" xmlns:a14="http://schemas.microsoft.com/office/drawing/2010/main" w="9525">
+                <a14:hiddenLine xmlns:a14="http://schemas.microsoft.com/office/drawing/2010/main" xmlns="" w="9525">
                   <a:solidFill>
                     <a:srgbClr val="000000"/>
                   </a:solidFill>
@@ -4811,7 +4811,7 @@
             </a:ln>
             <a:extLst>
               <a:ext uri="{91240B29-F687-4f45-9708-019B960494DF}">
-                <a14:hiddenLine xmlns="" xmlns:a14="http://schemas.microsoft.com/office/drawing/2010/main" w="9525">
+                <a14:hiddenLine xmlns:a14="http://schemas.microsoft.com/office/drawing/2010/main" xmlns="" w="9525">
                   <a:solidFill>
                     <a:srgbClr val="000000"/>
                   </a:solidFill>
@@ -9533,7 +9533,7 @@
           <a:noFill/>
           <a:extLst>
             <a:ext uri="{909E8E84-426E-40dd-AFC4-6F175D3DCCD1}">
-              <a14:hiddenFill xmlns="" xmlns:a14="http://schemas.microsoft.com/office/drawing/2010/main">
+              <a14:hiddenFill xmlns:a14="http://schemas.microsoft.com/office/drawing/2010/main" xmlns="">
                 <a:solidFill>
                   <a:srgbClr val="FFFFFF"/>
                 </a:solidFill>
@@ -9607,7 +9607,7 @@
               </a:ln>
               <a:extLst>
                 <a:ext uri="{91240B29-F687-4f45-9708-019B960494DF}">
-                  <a14:hiddenLine xmlns="" xmlns:a14="http://schemas.microsoft.com/office/drawing/2010/main" w="9525">
+                  <a14:hiddenLine xmlns:a14="http://schemas.microsoft.com/office/drawing/2010/main" xmlns="" w="9525">
                     <a:solidFill>
                       <a:srgbClr val="000000"/>
                     </a:solidFill>
@@ -9697,7 +9697,7 @@
               </a:ln>
               <a:extLst>
                 <a:ext uri="{91240B29-F687-4f45-9708-019B960494DF}">
-                  <a14:hiddenLine xmlns="" xmlns:a14="http://schemas.microsoft.com/office/drawing/2010/main" w="9525">
+                  <a14:hiddenLine xmlns:a14="http://schemas.microsoft.com/office/drawing/2010/main" xmlns="" w="9525">
                     <a:solidFill>
                       <a:srgbClr val="000000"/>
                     </a:solidFill>
@@ -9787,7 +9787,7 @@
               </a:ln>
               <a:extLst>
                 <a:ext uri="{91240B29-F687-4f45-9708-019B960494DF}">
-                  <a14:hiddenLine xmlns="" xmlns:a14="http://schemas.microsoft.com/office/drawing/2010/main" w="9525">
+                  <a14:hiddenLine xmlns:a14="http://schemas.microsoft.com/office/drawing/2010/main" xmlns="" w="9525">
                     <a:solidFill>
                       <a:srgbClr val="000000"/>
                     </a:solidFill>
@@ -9849,7 +9849,7 @@
               </a:ln>
               <a:extLst>
                 <a:ext uri="{91240B29-F687-4f45-9708-019B960494DF}">
-                  <a14:hiddenLine xmlns="" xmlns:a14="http://schemas.microsoft.com/office/drawing/2010/main" w="9525">
+                  <a14:hiddenLine xmlns:a14="http://schemas.microsoft.com/office/drawing/2010/main" xmlns="" w="9525">
                     <a:solidFill>
                       <a:srgbClr val="000000"/>
                     </a:solidFill>
@@ -9939,7 +9939,7 @@
               </a:ln>
               <a:extLst>
                 <a:ext uri="{91240B29-F687-4f45-9708-019B960494DF}">
-                  <a14:hiddenLine xmlns="" xmlns:a14="http://schemas.microsoft.com/office/drawing/2010/main" w="9525">
+                  <a14:hiddenLine xmlns:a14="http://schemas.microsoft.com/office/drawing/2010/main" xmlns="" w="9525">
                     <a:solidFill>
                       <a:srgbClr val="000000"/>
                     </a:solidFill>
@@ -10001,7 +10001,7 @@
               </a:ln>
               <a:extLst>
                 <a:ext uri="{91240B29-F687-4f45-9708-019B960494DF}">
-                  <a14:hiddenLine xmlns="" xmlns:a14="http://schemas.microsoft.com/office/drawing/2010/main" w="9525">
+                  <a14:hiddenLine xmlns:a14="http://schemas.microsoft.com/office/drawing/2010/main" xmlns="" w="9525">
                     <a:solidFill>
                       <a:srgbClr val="000000"/>
                     </a:solidFill>
@@ -10063,7 +10063,7 @@
               </a:ln>
               <a:extLst>
                 <a:ext uri="{91240B29-F687-4f45-9708-019B960494DF}">
-                  <a14:hiddenLine xmlns="" xmlns:a14="http://schemas.microsoft.com/office/drawing/2010/main" w="9525">
+                  <a14:hiddenLine xmlns:a14="http://schemas.microsoft.com/office/drawing/2010/main" xmlns="" w="9525">
                     <a:solidFill>
                       <a:srgbClr val="000000"/>
                     </a:solidFill>
@@ -10153,7 +10153,7 @@
               </a:ln>
               <a:extLst>
                 <a:ext uri="{91240B29-F687-4f45-9708-019B960494DF}">
-                  <a14:hiddenLine xmlns="" xmlns:a14="http://schemas.microsoft.com/office/drawing/2010/main" w="9525">
+                  <a14:hiddenLine xmlns:a14="http://schemas.microsoft.com/office/drawing/2010/main" xmlns="" w="9525">
                     <a:solidFill>
                       <a:srgbClr val="000000"/>
                     </a:solidFill>
@@ -10243,7 +10243,7 @@
               </a:ln>
               <a:extLst>
                 <a:ext uri="{91240B29-F687-4f45-9708-019B960494DF}">
-                  <a14:hiddenLine xmlns="" xmlns:a14="http://schemas.microsoft.com/office/drawing/2010/main" w="9525">
+                  <a14:hiddenLine xmlns:a14="http://schemas.microsoft.com/office/drawing/2010/main" xmlns="" w="9525">
                     <a:solidFill>
                       <a:srgbClr val="000000"/>
                     </a:solidFill>
@@ -10305,7 +10305,7 @@
               </a:ln>
               <a:extLst>
                 <a:ext uri="{91240B29-F687-4f45-9708-019B960494DF}">
-                  <a14:hiddenLine xmlns="" xmlns:a14="http://schemas.microsoft.com/office/drawing/2010/main" w="9525">
+                  <a14:hiddenLine xmlns:a14="http://schemas.microsoft.com/office/drawing/2010/main" xmlns="" w="9525">
                     <a:solidFill>
                       <a:srgbClr val="000000"/>
                     </a:solidFill>
@@ -10415,7 +10415,7 @@
               </a:ln>
               <a:extLst>
                 <a:ext uri="{91240B29-F687-4f45-9708-019B960494DF}">
-                  <a14:hiddenLine xmlns="" xmlns:a14="http://schemas.microsoft.com/office/drawing/2010/main" w="9525">
+                  <a14:hiddenLine xmlns:a14="http://schemas.microsoft.com/office/drawing/2010/main" xmlns="" w="9525">
                     <a:solidFill>
                       <a:srgbClr val="000000"/>
                     </a:solidFill>
@@ -10499,7 +10499,7 @@
               </a:ln>
               <a:extLst>
                 <a:ext uri="{91240B29-F687-4f45-9708-019B960494DF}">
-                  <a14:hiddenLine xmlns="" xmlns:a14="http://schemas.microsoft.com/office/drawing/2010/main" w="9525">
+                  <a14:hiddenLine xmlns:a14="http://schemas.microsoft.com/office/drawing/2010/main" xmlns="" w="9525">
                     <a:solidFill>
                       <a:srgbClr val="000000"/>
                     </a:solidFill>
@@ -10561,7 +10561,7 @@
               </a:ln>
               <a:extLst>
                 <a:ext uri="{91240B29-F687-4f45-9708-019B960494DF}">
-                  <a14:hiddenLine xmlns="" xmlns:a14="http://schemas.microsoft.com/office/drawing/2010/main" w="9525">
+                  <a14:hiddenLine xmlns:a14="http://schemas.microsoft.com/office/drawing/2010/main" xmlns="" w="9525">
                     <a:solidFill>
                       <a:srgbClr val="000000"/>
                     </a:solidFill>
@@ -10623,7 +10623,7 @@
               </a:ln>
               <a:extLst>
                 <a:ext uri="{91240B29-F687-4f45-9708-019B960494DF}">
-                  <a14:hiddenLine xmlns="" xmlns:a14="http://schemas.microsoft.com/office/drawing/2010/main" w="9525">
+                  <a14:hiddenLine xmlns:a14="http://schemas.microsoft.com/office/drawing/2010/main" xmlns="" w="9525">
                     <a:solidFill>
                       <a:srgbClr val="000000"/>
                     </a:solidFill>
@@ -10713,7 +10713,7 @@
               </a:ln>
               <a:extLst>
                 <a:ext uri="{91240B29-F687-4f45-9708-019B960494DF}">
-                  <a14:hiddenLine xmlns="" xmlns:a14="http://schemas.microsoft.com/office/drawing/2010/main" w="9525">
+                  <a14:hiddenLine xmlns:a14="http://schemas.microsoft.com/office/drawing/2010/main" xmlns="" w="9525">
                     <a:solidFill>
                       <a:srgbClr val="000000"/>
                     </a:solidFill>
@@ -10747,7 +10747,7 @@
               </a:ln>
               <a:extLst>
                 <a:ext uri="{91240B29-F687-4f45-9708-019B960494DF}">
-                  <a14:hiddenLine xmlns="" xmlns:a14="http://schemas.microsoft.com/office/drawing/2010/main" w="9525">
+                  <a14:hiddenLine xmlns:a14="http://schemas.microsoft.com/office/drawing/2010/main" xmlns="" w="9525">
                     <a:solidFill>
                       <a:srgbClr val="000000"/>
                     </a:solidFill>
@@ -10812,7 +10812,7 @@
               </a:ln>
               <a:extLst>
                 <a:ext uri="{91240B29-F687-4f45-9708-019B960494DF}">
-                  <a14:hiddenLine xmlns="" xmlns:a14="http://schemas.microsoft.com/office/drawing/2010/main" w="9525">
+                  <a14:hiddenLine xmlns:a14="http://schemas.microsoft.com/office/drawing/2010/main" xmlns="" w="9525">
                     <a:solidFill>
                       <a:srgbClr val="000000"/>
                     </a:solidFill>
@@ -10902,7 +10902,7 @@
               </a:ln>
               <a:extLst>
                 <a:ext uri="{91240B29-F687-4f45-9708-019B960494DF}">
-                  <a14:hiddenLine xmlns="" xmlns:a14="http://schemas.microsoft.com/office/drawing/2010/main" w="9525">
+                  <a14:hiddenLine xmlns:a14="http://schemas.microsoft.com/office/drawing/2010/main" xmlns="" w="9525">
                     <a:solidFill>
                       <a:srgbClr val="000000"/>
                     </a:solidFill>
@@ -10964,7 +10964,7 @@
               </a:ln>
               <a:extLst>
                 <a:ext uri="{91240B29-F687-4f45-9708-019B960494DF}">
-                  <a14:hiddenLine xmlns="" xmlns:a14="http://schemas.microsoft.com/office/drawing/2010/main" w="9525">
+                  <a14:hiddenLine xmlns:a14="http://schemas.microsoft.com/office/drawing/2010/main" xmlns="" w="9525">
                     <a:solidFill>
                       <a:srgbClr val="000000"/>
                     </a:solidFill>
@@ -11054,7 +11054,7 @@
               </a:ln>
               <a:extLst>
                 <a:ext uri="{91240B29-F687-4f45-9708-019B960494DF}">
-                  <a14:hiddenLine xmlns="" xmlns:a14="http://schemas.microsoft.com/office/drawing/2010/main" w="9525">
+                  <a14:hiddenLine xmlns:a14="http://schemas.microsoft.com/office/drawing/2010/main" xmlns="" w="9525">
                     <a:solidFill>
                       <a:srgbClr val="000000"/>
                     </a:solidFill>
@@ -11119,7 +11119,7 @@
               </a:ln>
               <a:extLst>
                 <a:ext uri="{91240B29-F687-4f45-9708-019B960494DF}">
-                  <a14:hiddenLine xmlns="" xmlns:a14="http://schemas.microsoft.com/office/drawing/2010/main" w="9525">
+                  <a14:hiddenLine xmlns:a14="http://schemas.microsoft.com/office/drawing/2010/main" xmlns="" w="9525">
                     <a:solidFill>
                       <a:srgbClr val="000000"/>
                     </a:solidFill>
@@ -11181,7 +11181,7 @@
               </a:ln>
               <a:extLst>
                 <a:ext uri="{91240B29-F687-4f45-9708-019B960494DF}">
-                  <a14:hiddenLine xmlns="" xmlns:a14="http://schemas.microsoft.com/office/drawing/2010/main" w="9525">
+                  <a14:hiddenLine xmlns:a14="http://schemas.microsoft.com/office/drawing/2010/main" xmlns="" w="9525">
                     <a:solidFill>
                       <a:srgbClr val="000000"/>
                     </a:solidFill>
@@ -11271,7 +11271,7 @@
               </a:ln>
               <a:extLst>
                 <a:ext uri="{91240B29-F687-4f45-9708-019B960494DF}">
-                  <a14:hiddenLine xmlns="" xmlns:a14="http://schemas.microsoft.com/office/drawing/2010/main" w="9525">
+                  <a14:hiddenLine xmlns:a14="http://schemas.microsoft.com/office/drawing/2010/main" xmlns="" w="9525">
                     <a:solidFill>
                       <a:srgbClr val="000000"/>
                     </a:solidFill>
@@ -11361,7 +11361,7 @@
               </a:ln>
               <a:extLst>
                 <a:ext uri="{91240B29-F687-4f45-9708-019B960494DF}">
-                  <a14:hiddenLine xmlns="" xmlns:a14="http://schemas.microsoft.com/office/drawing/2010/main" w="9525">
+                  <a14:hiddenLine xmlns:a14="http://schemas.microsoft.com/office/drawing/2010/main" xmlns="" w="9525">
                     <a:solidFill>
                       <a:srgbClr val="000000"/>
                     </a:solidFill>
@@ -11426,7 +11426,7 @@
               </a:ln>
               <a:extLst>
                 <a:ext uri="{91240B29-F687-4f45-9708-019B960494DF}">
-                  <a14:hiddenLine xmlns="" xmlns:a14="http://schemas.microsoft.com/office/drawing/2010/main" w="9525">
+                  <a14:hiddenLine xmlns:a14="http://schemas.microsoft.com/office/drawing/2010/main" xmlns="" w="9525">
                     <a:solidFill>
                       <a:srgbClr val="000000"/>
                     </a:solidFill>
@@ -11546,7 +11546,7 @@
               </a:ln>
               <a:extLst>
                 <a:ext uri="{91240B29-F687-4f45-9708-019B960494DF}">
-                  <a14:hiddenLine xmlns="" xmlns:a14="http://schemas.microsoft.com/office/drawing/2010/main" w="9525">
+                  <a14:hiddenLine xmlns:a14="http://schemas.microsoft.com/office/drawing/2010/main" xmlns="" w="9525">
                     <a:solidFill>
                       <a:srgbClr val="000000"/>
                     </a:solidFill>
@@ -11644,7 +11644,7 @@
               </a:ln>
               <a:extLst>
                 <a:ext uri="{91240B29-F687-4f45-9708-019B960494DF}">
-                  <a14:hiddenLine xmlns="" xmlns:a14="http://schemas.microsoft.com/office/drawing/2010/main" w="9525">
+                  <a14:hiddenLine xmlns:a14="http://schemas.microsoft.com/office/drawing/2010/main" xmlns="" w="9525">
                     <a:solidFill>
                       <a:srgbClr val="000000"/>
                     </a:solidFill>
@@ -11759,7 +11759,7 @@
               </a:ln>
               <a:extLst>
                 <a:ext uri="{91240B29-F687-4f45-9708-019B960494DF}">
-                  <a14:hiddenLine xmlns="" xmlns:a14="http://schemas.microsoft.com/office/drawing/2010/main" w="9525">
+                  <a14:hiddenLine xmlns:a14="http://schemas.microsoft.com/office/drawing/2010/main" xmlns="" w="9525">
                     <a:solidFill>
                       <a:srgbClr val="000000"/>
                     </a:solidFill>
@@ -11849,7 +11849,7 @@
               </a:ln>
               <a:extLst>
                 <a:ext uri="{91240B29-F687-4f45-9708-019B960494DF}">
-                  <a14:hiddenLine xmlns="" xmlns:a14="http://schemas.microsoft.com/office/drawing/2010/main" w="9525">
+                  <a14:hiddenLine xmlns:a14="http://schemas.microsoft.com/office/drawing/2010/main" xmlns="" w="9525">
                     <a:solidFill>
                       <a:srgbClr val="000000"/>
                     </a:solidFill>
@@ -11914,7 +11914,7 @@
               </a:ln>
               <a:extLst>
                 <a:ext uri="{91240B29-F687-4f45-9708-019B960494DF}">
-                  <a14:hiddenLine xmlns="" xmlns:a14="http://schemas.microsoft.com/office/drawing/2010/main" w="9525">
+                  <a14:hiddenLine xmlns:a14="http://schemas.microsoft.com/office/drawing/2010/main" xmlns="" w="9525">
                     <a:solidFill>
                       <a:srgbClr val="000000"/>
                     </a:solidFill>
@@ -12004,7 +12004,7 @@
               </a:ln>
               <a:extLst>
                 <a:ext uri="{91240B29-F687-4f45-9708-019B960494DF}">
-                  <a14:hiddenLine xmlns="" xmlns:a14="http://schemas.microsoft.com/office/drawing/2010/main" w="9525">
+                  <a14:hiddenLine xmlns:a14="http://schemas.microsoft.com/office/drawing/2010/main" xmlns="" w="9525">
                     <a:solidFill>
                       <a:srgbClr val="000000"/>
                     </a:solidFill>
@@ -12072,7 +12072,7 @@
               </a:ln>
               <a:extLst>
                 <a:ext uri="{91240B29-F687-4f45-9708-019B960494DF}">
-                  <a14:hiddenLine xmlns="" xmlns:a14="http://schemas.microsoft.com/office/drawing/2010/main" w="9525">
+                  <a14:hiddenLine xmlns:a14="http://schemas.microsoft.com/office/drawing/2010/main" xmlns="" w="9525">
                     <a:solidFill>
                       <a:srgbClr val="000000"/>
                     </a:solidFill>
@@ -12162,7 +12162,7 @@
               </a:ln>
               <a:extLst>
                 <a:ext uri="{91240B29-F687-4f45-9708-019B960494DF}">
-                  <a14:hiddenLine xmlns="" xmlns:a14="http://schemas.microsoft.com/office/drawing/2010/main" w="9525">
+                  <a14:hiddenLine xmlns:a14="http://schemas.microsoft.com/office/drawing/2010/main" xmlns="" w="9525">
                     <a:solidFill>
                       <a:srgbClr val="000000"/>
                     </a:solidFill>
@@ -12230,7 +12230,7 @@
               </a:ln>
               <a:extLst>
                 <a:ext uri="{91240B29-F687-4f45-9708-019B960494DF}">
-                  <a14:hiddenLine xmlns="" xmlns:a14="http://schemas.microsoft.com/office/drawing/2010/main" w="9525">
+                  <a14:hiddenLine xmlns:a14="http://schemas.microsoft.com/office/drawing/2010/main" xmlns="" w="9525">
                     <a:solidFill>
                       <a:srgbClr val="000000"/>
                     </a:solidFill>
@@ -12320,7 +12320,7 @@
               </a:ln>
               <a:extLst>
                 <a:ext uri="{91240B29-F687-4f45-9708-019B960494DF}">
-                  <a14:hiddenLine xmlns="" xmlns:a14="http://schemas.microsoft.com/office/drawing/2010/main" w="9525">
+                  <a14:hiddenLine xmlns:a14="http://schemas.microsoft.com/office/drawing/2010/main" xmlns="" w="9525">
                     <a:solidFill>
                       <a:srgbClr val="000000"/>
                     </a:solidFill>
@@ -12354,7 +12354,7 @@
               </a:ln>
               <a:extLst>
                 <a:ext uri="{91240B29-F687-4f45-9708-019B960494DF}">
-                  <a14:hiddenLine xmlns="" xmlns:a14="http://schemas.microsoft.com/office/drawing/2010/main" w="9525">
+                  <a14:hiddenLine xmlns:a14="http://schemas.microsoft.com/office/drawing/2010/main" xmlns="" w="9525">
                     <a:solidFill>
                       <a:srgbClr val="000000"/>
                     </a:solidFill>
@@ -13081,40 +13081,35 @@
           <a:chExt cx="0" cy="0"/>
         </a:xfrm>
       </p:grpSpPr>
-      <p:sp>
-        <p:nvSpPr>
-          <p:cNvPr id="3" name="Content Placeholder 2">
+      <p:pic>
+        <p:nvPicPr>
+          <p:cNvPr id="5" name="Content Placeholder 4" descr="A screenshot of a cell phone&#10;&#10;Description automatically generated">
             <a:extLst>
               <a:ext uri="{FF2B5EF4-FFF2-40B4-BE49-F238E27FC236}">
-                <a16:creationId xmlns:a16="http://schemas.microsoft.com/office/drawing/2014/main" id="{E528CC90-59DF-4AAC-BC12-38B558FD2408}"/>
+                <a16:creationId xmlns:a16="http://schemas.microsoft.com/office/drawing/2014/main" id="{7AE0BD2E-101B-4CBA-ABC3-C64DF86586EF}"/>
               </a:ext>
             </a:extLst>
           </p:cNvPr>
-          <p:cNvSpPr>
-            <a:spLocks noGrp="1"/>
-          </p:cNvSpPr>
+          <p:cNvPicPr>
+            <a:picLocks noGrp="1" noChangeAspect="1"/>
+          </p:cNvPicPr>
           <p:nvPr>
             <p:ph idx="1"/>
           </p:nvPr>
-        </p:nvSpPr>
+        </p:nvPicPr>
+        <p:blipFill>
+          <a:blip r:embed="rId2"/>
+          <a:stretch>
+            <a:fillRect/>
+          </a:stretch>
+        </p:blipFill>
         <p:spPr>
           <a:xfrm>
-            <a:off x="1141412" y="486032"/>
-            <a:ext cx="9905999" cy="5305169"/>
+            <a:off x="3638939" y="299163"/>
+            <a:ext cx="4366416" cy="6061328"/>
           </a:xfrm>
         </p:spPr>
-        <p:txBody>
-          <a:bodyPr/>
-          <a:lstStyle/>
-          <a:p>
-            <a:r>
-              <a:rPr lang="en-US" dirty="0"/>
-              <a:t>Flow chart</a:t>
-            </a:r>
-            <a:endParaRPr lang="ro-RO" dirty="0"/>
-          </a:p>
-        </p:txBody>
-      </p:sp>
+      </p:pic>
       <p:sp>
         <p:nvSpPr>
           <p:cNvPr id="4" name="Slide Number Placeholder 3">
@@ -15281,48 +15276,35 @@
           <a:chExt cx="0" cy="0"/>
         </a:xfrm>
       </p:grpSpPr>
-      <p:sp>
-        <p:nvSpPr>
-          <p:cNvPr id="3" name="Content Placeholder 2">
+      <p:pic>
+        <p:nvPicPr>
+          <p:cNvPr id="5" name="Content Placeholder 4" descr="A picture containing object&#10;&#10;Description automatically generated">
             <a:extLst>
               <a:ext uri="{FF2B5EF4-FFF2-40B4-BE49-F238E27FC236}">
-                <a16:creationId xmlns:a16="http://schemas.microsoft.com/office/drawing/2014/main" id="{393080D0-BE8A-4C14-B8A6-693F9AB2EC0B}"/>
+                <a16:creationId xmlns:a16="http://schemas.microsoft.com/office/drawing/2014/main" id="{80EF7DD5-36BB-45C5-BE4A-6F67C967B797}"/>
               </a:ext>
             </a:extLst>
           </p:cNvPr>
-          <p:cNvSpPr>
-            <a:spLocks noGrp="1"/>
-          </p:cNvSpPr>
+          <p:cNvPicPr>
+            <a:picLocks noGrp="1" noChangeAspect="1"/>
+          </p:cNvPicPr>
           <p:nvPr>
             <p:ph idx="1"/>
           </p:nvPr>
-        </p:nvSpPr>
+        </p:nvPicPr>
+        <p:blipFill>
+          <a:blip r:embed="rId2"/>
+          <a:stretch>
+            <a:fillRect/>
+          </a:stretch>
+        </p:blipFill>
         <p:spPr>
           <a:xfrm>
-            <a:off x="1141412" y="527222"/>
-            <a:ext cx="9905999" cy="5263979"/>
+            <a:off x="1986821" y="1090612"/>
+            <a:ext cx="7391400" cy="4676775"/>
           </a:xfrm>
         </p:spPr>
-        <p:txBody>
-          <a:bodyPr/>
-          <a:lstStyle/>
-          <a:p>
-            <a:r>
-              <a:rPr lang="en-US" dirty="0" err="1"/>
-              <a:t>Arhitectura</a:t>
-            </a:r>
-            <a:r>
-              <a:rPr lang="en-US" dirty="0"/>
-              <a:t> </a:t>
-            </a:r>
-            <a:r>
-              <a:rPr lang="en-US" dirty="0" err="1"/>
-              <a:t>diagrama</a:t>
-            </a:r>
-            <a:endParaRPr lang="ro-RO" dirty="0"/>
-          </a:p>
-        </p:txBody>
-      </p:sp>
+      </p:pic>
       <p:sp>
         <p:nvSpPr>
           <p:cNvPr id="4" name="Slide Number Placeholder 3">
@@ -15492,7 +15474,7 @@
             </a:r>
             <a:r>
               <a:rPr lang="en-US" dirty="0" err="1"/>
-              <a:t>clientul</a:t>
+              <a:t>utilizatorul</a:t>
             </a:r>
             <a:r>
               <a:rPr lang="en-US" dirty="0"/>
@@ -15500,7 +15482,7 @@
             </a:r>
             <a:r>
               <a:rPr lang="en-US" dirty="0" err="1"/>
-              <a:t>Acesta</a:t>
+              <a:t>Prin</a:t>
             </a:r>
             <a:r>
               <a:rPr lang="en-US" dirty="0"/>
@@ -15508,6 +15490,22 @@
             </a:r>
             <a:r>
               <a:rPr lang="en-US" dirty="0" err="1"/>
+              <a:t>intermediul</a:t>
+            </a:r>
+            <a:r>
+              <a:rPr lang="en-US" dirty="0"/>
+              <a:t> </a:t>
+            </a:r>
+            <a:r>
+              <a:rPr lang="en-US" dirty="0" err="1"/>
+              <a:t>acestuia</a:t>
+            </a:r>
+            <a:r>
+              <a:rPr lang="en-US" dirty="0"/>
+              <a:t> se </a:t>
+            </a:r>
+            <a:r>
+              <a:rPr lang="en-US" dirty="0" err="1"/>
               <a:t>va</a:t>
             </a:r>
             <a:r>
@@ -15536,11 +15534,19 @@
             </a:r>
             <a:r>
               <a:rPr lang="en-US" dirty="0"/>
+              <a:t>, </a:t>
+            </a:r>
+            <a:r>
+              <a:rPr lang="en-US" dirty="0" err="1"/>
+              <a:t>prin</a:t>
+            </a:r>
+            <a:r>
+              <a:rPr lang="en-US" dirty="0"/>
               <a:t> </a:t>
             </a:r>
             <a:r>
               <a:rPr lang="en-US" dirty="0" err="1"/>
-              <a:t>apeland</a:t>
+              <a:t>apelarea</a:t>
             </a:r>
             <a:r>
               <a:rPr lang="en-US" dirty="0"/>
@@ -15548,7 +15554,7 @@
             </a:r>
             <a:r>
               <a:rPr lang="en-US" dirty="0" err="1"/>
-              <a:t>metoda</a:t>
+              <a:t>metodei</a:t>
             </a:r>
             <a:r>
               <a:rPr lang="en-US" dirty="0"/>

</xml_diff>